<commit_message>
Updated Last Slide. Caught more typos in SRS
</commit_message>
<xml_diff>
--- a/Status Updates/2013 10 18.pptx
+++ b/Status Updates/2013 10 18.pptx
@@ -10478,9 +10478,16 @@
             <p:ph idx="1"/>
           </p:nvPr>
         </p:nvSpPr>
-        <p:spPr/>
+        <p:spPr>
+          <a:xfrm>
+            <a:off x="457200" y="1600200"/>
+            <a:ext cx="7620000" cy="4724400"/>
+          </a:xfrm>
+        </p:spPr>
         <p:txBody>
-          <a:bodyPr/>
+          <a:bodyPr>
+            <a:normAutofit/>
+          </a:bodyPr>
           <a:lstStyle/>
           <a:p>
             <a:r>
@@ -10510,33 +10517,178 @@
             </a:r>
           </a:p>
           <a:p>
+            <a:endParaRPr lang="en-US" dirty="0" smtClean="0"/>
+          </a:p>
+          <a:p>
+            <a:endParaRPr lang="en-US" dirty="0" smtClean="0"/>
+          </a:p>
+          <a:p>
+            <a:endParaRPr lang="en-US" dirty="0" smtClean="0"/>
+          </a:p>
+          <a:p>
+            <a:endParaRPr lang="en-US" dirty="0"/>
+          </a:p>
+          <a:p>
             <a:r>
               <a:rPr lang="en-US" dirty="0" smtClean="0"/>
-              <a:t>Picture of Success </a:t>
+              <a:t>Picture </a:t>
+            </a:r>
+            <a:r>
+              <a:rPr lang="en-US" dirty="0" smtClean="0"/>
+              <a:t>of Success </a:t>
             </a:r>
           </a:p>
           <a:p>
             <a:pPr lvl="1"/>
             <a:r>
-              <a:rPr lang="en-US" smtClean="0"/>
+              <a:rPr lang="en-US" dirty="0" smtClean="0"/>
               <a:t>4 </a:t>
             </a:r>
             <a:r>
               <a:rPr lang="en-US" dirty="0" smtClean="0"/>
-              <a:t>Critical  </a:t>
+              <a:t>Critical at High Risk</a:t>
             </a:r>
-          </a:p>
-          <a:p>
             <a:endParaRPr lang="en-US" dirty="0" smtClean="0"/>
           </a:p>
-          <a:p>
-            <a:endParaRPr lang="en-US" dirty="0" smtClean="0"/>
-          </a:p>
-          <a:p>
-            <a:endParaRPr lang="en-US" dirty="0" smtClean="0"/>
-          </a:p>
-          <a:p>
-            <a:endParaRPr lang="en-US" dirty="0" smtClean="0"/>
+        </p:txBody>
+      </p:sp>
+      <p:pic>
+        <p:nvPicPr>
+          <p:cNvPr id="1026" name="Picture 2"/>
+          <p:cNvPicPr>
+            <a:picLocks noChangeAspect="1" noChangeArrowheads="1"/>
+          </p:cNvPicPr>
+          <p:nvPr/>
+        </p:nvPicPr>
+        <p:blipFill>
+          <a:blip r:embed="rId2">
+            <a:extLst>
+              <a:ext uri="{28A0092B-C50C-407E-A947-70E740481C1C}">
+                <a14:useLocalDpi xmlns:a14="http://schemas.microsoft.com/office/drawing/2010/main" val="0"/>
+              </a:ext>
+            </a:extLst>
+          </a:blip>
+          <a:srcRect/>
+          <a:stretch>
+            <a:fillRect/>
+          </a:stretch>
+        </p:blipFill>
+        <p:spPr bwMode="auto">
+          <a:xfrm>
+            <a:off x="4098749" y="1246909"/>
+            <a:ext cx="3858955" cy="2819400"/>
+          </a:xfrm>
+          <a:prstGeom prst="rect">
+            <a:avLst/>
+          </a:prstGeom>
+          <a:noFill/>
+          <a:ln>
+            <a:noFill/>
+          </a:ln>
+          <a:effectLst/>
+          <a:extLst>
+            <a:ext uri="{909E8E84-426E-40DD-AFC4-6F175D3DCCD1}">
+              <a14:hiddenFill xmlns:a14="http://schemas.microsoft.com/office/drawing/2010/main">
+                <a:solidFill>
+                  <a:schemeClr val="accent1"/>
+                </a:solidFill>
+              </a14:hiddenFill>
+            </a:ext>
+            <a:ext uri="{91240B29-F687-4F45-9708-019B960494DF}">
+              <a14:hiddenLine xmlns:a14="http://schemas.microsoft.com/office/drawing/2010/main" w="9525">
+                <a:solidFill>
+                  <a:schemeClr val="tx1"/>
+                </a:solidFill>
+                <a:miter lim="800000"/>
+                <a:headEnd/>
+                <a:tailEnd/>
+              </a14:hiddenLine>
+            </a:ext>
+            <a:ext uri="{AF507438-7753-43E0-B8FC-AC1667EBCBE1}">
+              <a14:hiddenEffects xmlns:a14="http://schemas.microsoft.com/office/drawing/2010/main">
+                <a:effectLst>
+                  <a:outerShdw dist="35921" dir="2700000" algn="ctr" rotWithShape="0">
+                    <a:schemeClr val="bg2"/>
+                  </a:outerShdw>
+                </a:effectLst>
+              </a14:hiddenEffects>
+            </a:ext>
+          </a:extLst>
+        </p:spPr>
+      </p:pic>
+      <p:sp>
+        <p:nvSpPr>
+          <p:cNvPr id="5" name="TextBox 4"/>
+          <p:cNvSpPr txBox="1"/>
+          <p:nvPr/>
+        </p:nvSpPr>
+        <p:spPr>
+          <a:xfrm>
+            <a:off x="3810000" y="4800600"/>
+            <a:ext cx="4267200" cy="1200329"/>
+          </a:xfrm>
+          <a:prstGeom prst="rect">
+            <a:avLst/>
+          </a:prstGeom>
+          <a:noFill/>
+          <a:ln>
+            <a:solidFill>
+              <a:schemeClr val="tx1"/>
+            </a:solidFill>
+          </a:ln>
+        </p:spPr>
+        <p:txBody>
+          <a:bodyPr wrap="square" rtlCol="0">
+            <a:spAutoFit/>
+          </a:bodyPr>
+          <a:lstStyle/>
+          <a:p>
+            <a:r>
+              <a:rPr lang="en-US" dirty="0" smtClean="0"/>
+              <a:t>3.14 </a:t>
+            </a:r>
+            <a:r>
+              <a:rPr lang="en-US" dirty="0"/>
+              <a:t>Slicing Geometry into Thickness Levels</a:t>
+            </a:r>
+            <a:br>
+              <a:rPr lang="en-US" dirty="0"/>
+            </a:br>
+            <a:r>
+              <a:rPr lang="en-US" dirty="0" smtClean="0"/>
+              <a:t>3.11 </a:t>
+            </a:r>
+            <a:r>
+              <a:rPr lang="en-US" dirty="0"/>
+              <a:t>Creating Printing Paths</a:t>
+            </a:r>
+            <a:br>
+              <a:rPr lang="en-US" dirty="0"/>
+            </a:br>
+            <a:r>
+              <a:rPr lang="en-US" dirty="0" smtClean="0"/>
+              <a:t>3.3   </a:t>
+            </a:r>
+            <a:r>
+              <a:rPr lang="en-US" dirty="0"/>
+              <a:t>Generating Machine Instructions</a:t>
+            </a:r>
+            <a:br>
+              <a:rPr lang="en-US" dirty="0"/>
+            </a:br>
+            <a:r>
+              <a:rPr lang="en-US" dirty="0" smtClean="0"/>
+              <a:t>3.4   </a:t>
+            </a:r>
+            <a:r>
+              <a:rPr lang="en-US" dirty="0"/>
+              <a:t>Issuing Machine </a:t>
+            </a:r>
+            <a:r>
+              <a:rPr lang="en-US" dirty="0" smtClean="0"/>
+              <a:t>Instructions</a:t>
+            </a:r>
+            <a:endParaRPr lang="en-US" dirty="0"/>
           </a:p>
         </p:txBody>
       </p:sp>

</xml_diff>